<commit_message>
Updates Database records, adds columns to 'Users' table, and updates Powerpoint Presentation that explains application
</commit_message>
<xml_diff>
--- a/Presentation/Psychology Research Database.pptx
+++ b/Presentation/Psychology Research Database.pptx
@@ -151,6 +151,10 @@
 </p:presentation>
 </file>
 
+<file path=ppt/revisionInfo.xml><?xml version="1.0" encoding="utf-8"?>
+<p1510:revInfo xmlns:a="http://schemas.openxmlformats.org/drawingml/2006/main" xmlns:r="http://schemas.openxmlformats.org/officeDocument/2006/relationships" xmlns:p1510="http://schemas.microsoft.com/office/powerpoint/2015/10/main"/>
+</file>
+
 <file path=ppt/handoutMasters/handoutMaster1.xml><?xml version="1.0" encoding="utf-8"?>
 <p:handoutMaster xmlns:a="http://schemas.openxmlformats.org/drawingml/2006/main" xmlns:r="http://schemas.openxmlformats.org/officeDocument/2006/relationships" xmlns:p="http://schemas.openxmlformats.org/presentationml/2006/main">
   <p:cSld>
@@ -233,7 +237,7 @@
           <a:p>
             <a:fld id="{BA5A207F-0F91-42F2-96D0-049C6003623B}" type="datetimeFigureOut">
               <a:rPr lang="en-US"/>
-              <a:t>11/25/2017</a:t>
+              <a:t>11/28/2017</a:t>
             </a:fld>
             <a:endParaRPr/>
           </a:p>
@@ -398,7 +402,7 @@
           <a:p>
             <a:fld id="{48CC13F5-F2B1-464B-BE8F-27ABFBD2FBDE}" type="datetimeFigureOut">
               <a:rPr lang="en-US"/>
-              <a:t>11/25/2017</a:t>
+              <a:t>11/28/2017</a:t>
             </a:fld>
             <a:endParaRPr/>
           </a:p>
@@ -953,7 +957,7 @@
             <a:fld id="{3CD9712D-992A-4AB1-A5C2-575F75921AA2}" type="datetimeFigureOut">
               <a:rPr lang="en-US" smtClean="0"/>
               <a:pPr/>
-              <a:t>11/25/2017</a:t>
+              <a:t>11/28/2017</a:t>
             </a:fld>
             <a:endParaRPr lang="en-US" dirty="0"/>
           </a:p>
@@ -1181,7 +1185,7 @@
             <a:fld id="{3CD9712D-992A-4AB1-A5C2-575F75921AA2}" type="datetimeFigureOut">
               <a:rPr lang="en-US" smtClean="0"/>
               <a:pPr/>
-              <a:t>11/25/2017</a:t>
+              <a:t>11/28/2017</a:t>
             </a:fld>
             <a:endParaRPr lang="en-US"/>
           </a:p>
@@ -1403,7 +1407,7 @@
             <a:fld id="{3CD9712D-992A-4AB1-A5C2-575F75921AA2}" type="datetimeFigureOut">
               <a:rPr lang="en-US" smtClean="0"/>
               <a:pPr/>
-              <a:t>11/25/2017</a:t>
+              <a:t>11/28/2017</a:t>
             </a:fld>
             <a:endParaRPr lang="en-US"/>
           </a:p>
@@ -1615,7 +1619,7 @@
             <a:fld id="{3CD9712D-992A-4AB1-A5C2-575F75921AA2}" type="datetimeFigureOut">
               <a:rPr lang="en-US" smtClean="0"/>
               <a:pPr/>
-              <a:t>11/25/2017</a:t>
+              <a:t>11/28/2017</a:t>
             </a:fld>
             <a:endParaRPr lang="en-US" dirty="0"/>
           </a:p>
@@ -1906,7 +1910,7 @@
             <a:fld id="{3CD9712D-992A-4AB1-A5C2-575F75921AA2}" type="datetimeFigureOut">
               <a:rPr lang="en-US" smtClean="0"/>
               <a:pPr/>
-              <a:t>11/25/2017</a:t>
+              <a:t>11/28/2017</a:t>
             </a:fld>
             <a:endParaRPr lang="en-US"/>
           </a:p>
@@ -2224,7 +2228,7 @@
             <a:fld id="{3CD9712D-992A-4AB1-A5C2-575F75921AA2}" type="datetimeFigureOut">
               <a:rPr lang="en-US" smtClean="0"/>
               <a:pPr/>
-              <a:t>11/25/2017</a:t>
+              <a:t>11/28/2017</a:t>
             </a:fld>
             <a:endParaRPr lang="en-US" dirty="0"/>
           </a:p>
@@ -2682,7 +2686,7 @@
             <a:fld id="{3CD9712D-992A-4AB1-A5C2-575F75921AA2}" type="datetimeFigureOut">
               <a:rPr lang="en-US" smtClean="0"/>
               <a:pPr/>
-              <a:t>11/25/2017</a:t>
+              <a:t>11/28/2017</a:t>
             </a:fld>
             <a:endParaRPr lang="en-US" dirty="0"/>
           </a:p>
@@ -2826,7 +2830,7 @@
             <a:fld id="{3CD9712D-992A-4AB1-A5C2-575F75921AA2}" type="datetimeFigureOut">
               <a:rPr lang="en-US" smtClean="0"/>
               <a:pPr/>
-              <a:t>11/25/2017</a:t>
+              <a:t>11/28/2017</a:t>
             </a:fld>
             <a:endParaRPr lang="en-US" dirty="0"/>
           </a:p>
@@ -2961,7 +2965,7 @@
             <a:fld id="{3CD9712D-992A-4AB1-A5C2-575F75921AA2}" type="datetimeFigureOut">
               <a:rPr lang="en-US" smtClean="0"/>
               <a:pPr/>
-              <a:t>11/25/2017</a:t>
+              <a:t>11/28/2017</a:t>
             </a:fld>
             <a:endParaRPr lang="en-US" dirty="0"/>
           </a:p>
@@ -3270,7 +3274,7 @@
             <a:fld id="{3CD9712D-992A-4AB1-A5C2-575F75921AA2}" type="datetimeFigureOut">
               <a:rPr lang="en-US" smtClean="0"/>
               <a:pPr/>
-              <a:t>11/25/2017</a:t>
+              <a:t>11/28/2017</a:t>
             </a:fld>
             <a:endParaRPr lang="en-US"/>
           </a:p>
@@ -3783,7 +3787,7 @@
             <a:fld id="{3CD9712D-992A-4AB1-A5C2-575F75921AA2}" type="datetimeFigureOut">
               <a:rPr lang="en-US" smtClean="0"/>
               <a:pPr/>
-              <a:t>11/25/2017</a:t>
+              <a:t>11/28/2017</a:t>
             </a:fld>
             <a:endParaRPr lang="en-US" dirty="0"/>
           </a:p>
@@ -4235,7 +4239,7 @@
           <a:p>
             <a:r>
               <a:rPr lang="en-US" dirty="0"/>
-              <a:t>Created by </a:t>
+              <a:t>Created by Aaron Branham, Joel Branham, </a:t>
             </a:r>
             <a:r>
               <a:rPr lang="en-US" dirty="0" err="1"/>
@@ -4243,7 +4247,7 @@
             </a:r>
             <a:r>
               <a:rPr lang="en-US" dirty="0"/>
-              <a:t> Mathews, Aaron Branham, and Joel Branham</a:t>
+              <a:t> Mathew, and Kristen Burger</a:t>
             </a:r>
           </a:p>
         </p:txBody>
@@ -4723,10 +4727,10 @@
       </p:sp>
       <p:pic>
         <p:nvPicPr>
-          <p:cNvPr id="10" name="Picture 9">
+          <p:cNvPr id="4" name="Picture 3">
             <a:extLst>
               <a:ext uri="{FF2B5EF4-FFF2-40B4-BE49-F238E27FC236}">
-                <a16:creationId xmlns:a16="http://schemas.microsoft.com/office/drawing/2014/main" id="{5DFFEBE2-8132-4C6A-B34E-164CD5AE94C0}"/>
+                <a16:creationId xmlns:a16="http://schemas.microsoft.com/office/drawing/2014/main" id="{5F84C583-97D8-4AF4-9170-A2F371EBD977}"/>
               </a:ext>
             </a:extLst>
           </p:cNvPr>
@@ -4749,8 +4753,8 @@
         </p:blipFill>
         <p:spPr>
           <a:xfrm>
-            <a:off x="912812" y="1752600"/>
-            <a:ext cx="10804904" cy="4824681"/>
+            <a:off x="836612" y="1676400"/>
+            <a:ext cx="10771736" cy="4970658"/>
           </a:xfrm>
           <a:prstGeom prst="rect">
             <a:avLst/>
@@ -5612,11 +5616,11 @@
   <p:clrMapOvr>
     <a:masterClrMapping/>
   </p:clrMapOvr>
-  <mc:AlternateContent xmlns:mc="http://schemas.openxmlformats.org/markup-compatibility/2006">
-    <mc:Choice xmlns:p14="http://schemas.microsoft.com/office/powerpoint/2010/main" Requires="p14">
+  <mc:AlternateContent xmlns:mc="http://schemas.openxmlformats.org/markup-compatibility/2006" xmlns:p14="http://schemas.microsoft.com/office/powerpoint/2010/main">
+    <mc:Choice Requires="p14">
       <p:transition p14:dur="0"/>
     </mc:Choice>
-    <mc:Fallback>
+    <mc:Fallback xmlns="">
       <p:transition/>
     </mc:Fallback>
   </mc:AlternateContent>
@@ -6114,11 +6118,11 @@
   <p:clrMapOvr>
     <a:masterClrMapping/>
   </p:clrMapOvr>
-  <mc:AlternateContent xmlns:mc="http://schemas.openxmlformats.org/markup-compatibility/2006">
-    <mc:Choice xmlns:p14="http://schemas.microsoft.com/office/powerpoint/2010/main" Requires="p14">
+  <mc:AlternateContent xmlns:mc="http://schemas.openxmlformats.org/markup-compatibility/2006" xmlns:p14="http://schemas.microsoft.com/office/powerpoint/2010/main">
+    <mc:Choice Requires="p14">
       <p:transition p14:dur="10"/>
     </mc:Choice>
-    <mc:Fallback>
+    <mc:Fallback xmlns="">
       <p:transition/>
     </mc:Fallback>
   </mc:AlternateContent>
@@ -6782,6 +6786,15 @@
 </file>
 
 <file path=customXml/item1.xml><?xml version="1.0" encoding="utf-8"?>
+<?mso-contentType ?>
+<FormTemplates xmlns="http://schemas.microsoft.com/sharepoint/v3/contenttype/forms">
+  <Display>DocumentLibraryForm</Display>
+  <Edit>AssetEditForm</Edit>
+  <New>DocumentLibraryForm</New>
+</FormTemplates>
+</file>
+
+<file path=customXml/item2.xml><?xml version="1.0" encoding="utf-8"?>
 <p:properties xmlns:p="http://schemas.microsoft.com/office/2006/metadata/properties" xmlns:xsi="http://www.w3.org/2001/XMLSchema-instance" xmlns:pc="http://schemas.microsoft.com/office/infopath/2007/PartnerControls">
   <documentManagement>
     <DirectSourceMarket xmlns="4873beb7-5857-4685-be1f-d57550cc96cc" xsi:nil="true"/>
@@ -6905,15 +6918,6 @@
     <LocMarketGroupTiers2 xmlns="4873beb7-5857-4685-be1f-d57550cc96cc" xsi:nil="true"/>
   </documentManagement>
 </p:properties>
-</file>
-
-<file path=customXml/item2.xml><?xml version="1.0" encoding="utf-8"?>
-<?mso-contentType ?>
-<FormTemplates xmlns="http://schemas.microsoft.com/sharepoint/v3/contenttype/forms">
-  <Display>DocumentLibraryForm</Display>
-  <Edit>AssetEditForm</Edit>
-  <New>DocumentLibraryForm</New>
-</FormTemplates>
 </file>
 
 <file path=customXml/item3.xml><?xml version="1.0" encoding="utf-8"?>
@@ -7957,6 +7961,14 @@
 </file>
 
 <file path=customXml/itemProps1.xml><?xml version="1.0" encoding="utf-8"?>
+<ds:datastoreItem xmlns:ds="http://schemas.openxmlformats.org/officeDocument/2006/customXml" ds:itemID="{211E33DF-2340-4F4E-B874-B73FEFEBFC8D}">
+  <ds:schemaRefs>
+    <ds:schemaRef ds:uri="http://schemas.microsoft.com/sharepoint/v3/contenttype/forms"/>
+  </ds:schemaRefs>
+</ds:datastoreItem>
+</file>
+
+<file path=customXml/itemProps2.xml><?xml version="1.0" encoding="utf-8"?>
 <ds:datastoreItem xmlns:ds="http://schemas.openxmlformats.org/officeDocument/2006/customXml" ds:itemID="{0F249165-F638-412C-8E0A-DFB7045CA2E0}">
   <ds:schemaRefs>
     <ds:schemaRef ds:uri="http://schemas.openxmlformats.org/package/2006/metadata/core-properties"/>
@@ -7968,14 +7980,6 @@
     <ds:schemaRef ds:uri="http://schemas.microsoft.com/office/infopath/2007/PartnerControls"/>
     <ds:schemaRef ds:uri="http://www.w3.org/XML/1998/namespace"/>
     <ds:schemaRef ds:uri="http://purl.org/dc/dcmitype/"/>
-  </ds:schemaRefs>
-</ds:datastoreItem>
-</file>
-
-<file path=customXml/itemProps2.xml><?xml version="1.0" encoding="utf-8"?>
-<ds:datastoreItem xmlns:ds="http://schemas.openxmlformats.org/officeDocument/2006/customXml" ds:itemID="{211E33DF-2340-4F4E-B874-B73FEFEBFC8D}">
-  <ds:schemaRefs>
-    <ds:schemaRef ds:uri="http://schemas.microsoft.com/sharepoint/v3/contenttype/forms"/>
   </ds:schemaRefs>
 </ds:datastoreItem>
 </file>

</xml_diff>